<commit_message>
added video inside pptx
</commit_message>
<xml_diff>
--- a/CST8917_Final_Oral_Exam_Presentation.pptx
+++ b/CST8917_Final_Oral_Exam_Presentation.pptx
@@ -7639,7 +7639,7 @@
         </p:nvSpPr>
         <p:spPr>
           <a:xfrm>
-            <a:off x="3286100" y="2564904"/>
+            <a:off x="3430116" y="764704"/>
             <a:ext cx="4896544" cy="1446550"/>
           </a:xfrm>
           <a:prstGeom prst="rect">
@@ -7672,6 +7672,39 @@
           </a:p>
         </p:txBody>
       </p:sp>
+      <p:pic>
+        <p:nvPicPr>
+          <p:cNvPr id="5" name="Online Media 4" title="CST8917 Final Oral Exam">
+            <a:hlinkClick r:id="" action="ppaction://media"/>
+            <a:extLst>
+              <a:ext uri="{FF2B5EF4-FFF2-40B4-BE49-F238E27FC236}">
+                <a16:creationId xmlns:a16="http://schemas.microsoft.com/office/drawing/2014/main" id="{E867A8CA-204B-EBE4-D3EC-F2C694F450B3}"/>
+              </a:ext>
+            </a:extLst>
+          </p:cNvPr>
+          <p:cNvPicPr>
+            <a:picLocks noRot="1" noChangeAspect="1"/>
+          </p:cNvPicPr>
+          <p:nvPr>
+            <a:videoFile r:link="rId1"/>
+          </p:nvPr>
+        </p:nvPicPr>
+        <p:blipFill>
+          <a:blip r:embed="rId3"/>
+          <a:stretch>
+            <a:fillRect/>
+          </a:stretch>
+        </p:blipFill>
+        <p:spPr>
+          <a:xfrm>
+            <a:off x="3286100" y="2564904"/>
+            <a:ext cx="5328592" cy="3996444"/>
+          </a:xfrm>
+          <a:prstGeom prst="rect">
+            <a:avLst/>
+          </a:prstGeom>
+        </p:spPr>
+      </p:pic>
     </p:spTree>
     <p:extLst>
       <p:ext uri="{BB962C8B-B14F-4D97-AF65-F5344CB8AC3E}">
@@ -7682,18 +7715,153 @@
   <p:clrMapOvr>
     <a:masterClrMapping/>
   </p:clrMapOvr>
-  <mc:AlternateContent xmlns:mc="http://schemas.openxmlformats.org/markup-compatibility/2006">
-    <mc:Choice xmlns:p14="http://schemas.microsoft.com/office/powerpoint/2010/main" Requires="p14">
+  <mc:AlternateContent xmlns:mc="http://schemas.openxmlformats.org/markup-compatibility/2006" xmlns:p14="http://schemas.microsoft.com/office/powerpoint/2010/main">
+    <mc:Choice Requires="p14">
       <p:transition spd="slow" p14:dur="800">
         <p14:flythrough/>
       </p:transition>
     </mc:Choice>
-    <mc:Fallback>
+    <mc:Fallback xmlns="">
       <p:transition spd="slow">
         <p:fade/>
       </p:transition>
     </mc:Fallback>
   </mc:AlternateContent>
+  <p:timing>
+    <p:tnLst>
+      <p:par>
+        <p:cTn id="1" dur="indefinite" restart="never" nodeType="tmRoot">
+          <p:childTnLst>
+            <p:seq concurrent="1" nextAc="seek">
+              <p:cTn id="2" dur="indefinite" nodeType="mainSeq">
+                <p:childTnLst>
+                  <p:par>
+                    <p:cTn id="3" fill="hold">
+                      <p:stCondLst>
+                        <p:cond delay="indefinite"/>
+                      </p:stCondLst>
+                      <p:childTnLst>
+                        <p:par>
+                          <p:cTn id="4" fill="hold">
+                            <p:stCondLst>
+                              <p:cond delay="0"/>
+                            </p:stCondLst>
+                            <p:childTnLst>
+                              <p:par>
+                                <p:cTn id="5" presetID="1" presetClass="mediacall" presetSubtype="0" fill="hold" nodeType="clickEffect">
+                                  <p:stCondLst>
+                                    <p:cond delay="0"/>
+                                  </p:stCondLst>
+                                  <p:childTnLst>
+                                    <p:cmd type="call" cmd="playFrom(0.0)">
+                                      <p:cBhvr>
+                                        <p:cTn id="6" dur="1" fill="hold"/>
+                                        <p:tgtEl>
+                                          <p:spTgt spid="5"/>
+                                        </p:tgtEl>
+                                      </p:cBhvr>
+                                    </p:cmd>
+                                  </p:childTnLst>
+                                </p:cTn>
+                              </p:par>
+                            </p:childTnLst>
+                          </p:cTn>
+                        </p:par>
+                      </p:childTnLst>
+                    </p:cTn>
+                  </p:par>
+                </p:childTnLst>
+              </p:cTn>
+              <p:prevCondLst>
+                <p:cond evt="onPrev" delay="0">
+                  <p:tgtEl>
+                    <p:sldTgt/>
+                  </p:tgtEl>
+                </p:cond>
+              </p:prevCondLst>
+              <p:nextCondLst>
+                <p:cond evt="onNext" delay="0">
+                  <p:tgtEl>
+                    <p:sldTgt/>
+                  </p:tgtEl>
+                </p:cond>
+              </p:nextCondLst>
+            </p:seq>
+            <p:video>
+              <p:cMediaNode vol="80000">
+                <p:cTn id="7" fill="hold" display="0">
+                  <p:stCondLst>
+                    <p:cond delay="indefinite"/>
+                  </p:stCondLst>
+                </p:cTn>
+                <p:tgtEl>
+                  <p:spTgt spid="5"/>
+                </p:tgtEl>
+              </p:cMediaNode>
+            </p:video>
+            <p:seq concurrent="1" nextAc="seek">
+              <p:cTn id="8" restart="whenNotActive" fill="hold" evtFilter="cancelBubble" nodeType="interactiveSeq">
+                <p:stCondLst>
+                  <p:cond evt="onClick" delay="0">
+                    <p:tgtEl>
+                      <p:spTgt spid="5"/>
+                    </p:tgtEl>
+                  </p:cond>
+                </p:stCondLst>
+                <p:endSync evt="end" delay="0">
+                  <p:rtn val="all"/>
+                </p:endSync>
+                <p:childTnLst>
+                  <p:par>
+                    <p:cTn id="9" fill="hold">
+                      <p:stCondLst>
+                        <p:cond delay="0"/>
+                      </p:stCondLst>
+                      <p:childTnLst>
+                        <p:par>
+                          <p:cTn id="10" fill="hold">
+                            <p:stCondLst>
+                              <p:cond delay="0"/>
+                            </p:stCondLst>
+                            <p:childTnLst>
+                              <p:par>
+                                <p:cTn id="11" presetID="2" presetClass="mediacall" presetSubtype="0" fill="hold" nodeType="clickEffect">
+                                  <p:stCondLst>
+                                    <p:cond delay="0"/>
+                                  </p:stCondLst>
+                                  <p:childTnLst>
+                                    <p:cmd type="call" cmd="togglePause">
+                                      <p:cBhvr>
+                                        <p:cTn id="12" dur="1" fill="hold"/>
+                                        <p:tgtEl>
+                                          <p:spTgt spid="5"/>
+                                        </p:tgtEl>
+                                      </p:cBhvr>
+                                    </p:cmd>
+                                  </p:childTnLst>
+                                </p:cTn>
+                              </p:par>
+                            </p:childTnLst>
+                          </p:cTn>
+                        </p:par>
+                      </p:childTnLst>
+                    </p:cTn>
+                  </p:par>
+                </p:childTnLst>
+              </p:cTn>
+              <p:nextCondLst>
+                <p:cond evt="onClick" delay="0">
+                  <p:tgtEl>
+                    <p:spTgt spid="5"/>
+                  </p:tgtEl>
+                </p:cond>
+              </p:nextCondLst>
+            </p:seq>
+          </p:childTnLst>
+        </p:cTn>
+      </p:par>
+    </p:tnLst>
+  </p:timing>
 </p:sld>
 </file>
 
@@ -14748,12 +14916,11 @@
 </file>
 
 <file path=customXml/item1.xml><?xml version="1.0" encoding="utf-8"?>
-<?mso-contentType ?>
-<FormTemplates xmlns="http://schemas.microsoft.com/sharepoint/v3/contenttype/forms">
-  <Display>DocumentLibraryForm</Display>
-  <Edit>DocumentLibraryForm</Edit>
-  <New>DocumentLibraryForm</New>
-</FormTemplates>
+<p:properties xmlns:p="http://schemas.microsoft.com/office/2006/metadata/properties" xmlns:xsi="http://www.w3.org/2001/XMLSchema-instance" xmlns:pc="http://schemas.microsoft.com/office/infopath/2007/PartnerControls">
+  <documentManagement>
+    <_activity xmlns="34c01fac-d9f3-480c-9b42-9d7107ab8273" xsi:nil="true"/>
+  </documentManagement>
+</p:properties>
 </file>
 
 <file path=customXml/item2.xml><?xml version="1.0" encoding="utf-8"?>
@@ -14937,17 +15104,26 @@
 </file>
 
 <file path=customXml/item3.xml><?xml version="1.0" encoding="utf-8"?>
-<p:properties xmlns:p="http://schemas.microsoft.com/office/2006/metadata/properties" xmlns:xsi="http://www.w3.org/2001/XMLSchema-instance" xmlns:pc="http://schemas.microsoft.com/office/infopath/2007/PartnerControls">
-  <documentManagement>
-    <_activity xmlns="34c01fac-d9f3-480c-9b42-9d7107ab8273" xsi:nil="true"/>
-  </documentManagement>
-</p:properties>
+<?mso-contentType ?>
+<FormTemplates xmlns="http://schemas.microsoft.com/sharepoint/v3/contenttype/forms">
+  <Display>DocumentLibraryForm</Display>
+  <Edit>DocumentLibraryForm</Edit>
+  <New>DocumentLibraryForm</New>
+</FormTemplates>
 </file>
 
 <file path=customXml/itemProps1.xml><?xml version="1.0" encoding="utf-8"?>
-<ds:datastoreItem xmlns:ds="http://schemas.openxmlformats.org/officeDocument/2006/customXml" ds:itemID="{DDEE3F12-403A-44ED-AE86-0837013D1DD6}">
+<ds:datastoreItem xmlns:ds="http://schemas.openxmlformats.org/officeDocument/2006/customXml" ds:itemID="{60C67BEE-D13F-4BD2-98A5-34D8A0977F68}">
   <ds:schemaRefs>
-    <ds:schemaRef ds:uri="http://schemas.microsoft.com/sharepoint/v3/contenttype/forms"/>
+    <ds:schemaRef ds:uri="http://schemas.microsoft.com/office/2006/documentManagement/types"/>
+    <ds:schemaRef ds:uri="http://schemas.microsoft.com/office/2006/metadata/properties"/>
+    <ds:schemaRef ds:uri="34c01fac-d9f3-480c-9b42-9d7107ab8273"/>
+    <ds:schemaRef ds:uri="http://purl.org/dc/dcmitype/"/>
+    <ds:schemaRef ds:uri="http://schemas.microsoft.com/office/infopath/2007/PartnerControls"/>
+    <ds:schemaRef ds:uri="http://purl.org/dc/terms/"/>
+    <ds:schemaRef ds:uri="http://www.w3.org/XML/1998/namespace"/>
+    <ds:schemaRef ds:uri="http://schemas.openxmlformats.org/package/2006/metadata/core-properties"/>
+    <ds:schemaRef ds:uri="http://purl.org/dc/elements/1.1/"/>
   </ds:schemaRefs>
 </ds:datastoreItem>
 </file>
@@ -14971,17 +15147,9 @@
 </file>
 
 <file path=customXml/itemProps3.xml><?xml version="1.0" encoding="utf-8"?>
-<ds:datastoreItem xmlns:ds="http://schemas.openxmlformats.org/officeDocument/2006/customXml" ds:itemID="{60C67BEE-D13F-4BD2-98A5-34D8A0977F68}">
+<ds:datastoreItem xmlns:ds="http://schemas.openxmlformats.org/officeDocument/2006/customXml" ds:itemID="{DDEE3F12-403A-44ED-AE86-0837013D1DD6}">
   <ds:schemaRefs>
-    <ds:schemaRef ds:uri="http://schemas.microsoft.com/office/2006/documentManagement/types"/>
-    <ds:schemaRef ds:uri="http://schemas.microsoft.com/office/2006/metadata/properties"/>
-    <ds:schemaRef ds:uri="34c01fac-d9f3-480c-9b42-9d7107ab8273"/>
-    <ds:schemaRef ds:uri="http://purl.org/dc/dcmitype/"/>
-    <ds:schemaRef ds:uri="http://schemas.microsoft.com/office/infopath/2007/PartnerControls"/>
-    <ds:schemaRef ds:uri="http://purl.org/dc/terms/"/>
-    <ds:schemaRef ds:uri="http://www.w3.org/XML/1998/namespace"/>
-    <ds:schemaRef ds:uri="http://schemas.openxmlformats.org/package/2006/metadata/core-properties"/>
-    <ds:schemaRef ds:uri="http://purl.org/dc/elements/1.1/"/>
+    <ds:schemaRef ds:uri="http://schemas.microsoft.com/sharepoint/v3/contenttype/forms"/>
   </ds:schemaRefs>
 </ds:datastoreItem>
 </file>
</xml_diff>